<commit_message>
Added black-box testing excel doc
</commit_message>
<xml_diff>
--- a/PokemonPresentation.pptx
+++ b/PokemonPresentation.pptx
@@ -157,8 +157,8 @@
   </pc:docChgLst>
   <pc:docChgLst>
     <pc:chgData name="Mason Cole" userId="e911393877ad0ee3" providerId="LiveId" clId="{3F842226-8888-4DE6-89C0-62A134D54048}"/>
-    <pc:docChg chg="modSld">
-      <pc:chgData name="Mason Cole" userId="e911393877ad0ee3" providerId="LiveId" clId="{3F842226-8888-4DE6-89C0-62A134D54048}" dt="2021-04-29T04:54:31.201" v="46" actId="1036"/>
+    <pc:docChg chg="undo redo custSel modSld">
+      <pc:chgData name="Mason Cole" userId="e911393877ad0ee3" providerId="LiveId" clId="{3F842226-8888-4DE6-89C0-62A134D54048}" dt="2021-04-29T11:06:35.181" v="143" actId="20577"/>
       <pc:docMkLst>
         <pc:docMk/>
       </pc:docMkLst>
@@ -232,7 +232,7 @@
         </pc:spChg>
       </pc:sldChg>
       <pc:sldChg chg="modSp mod">
-        <pc:chgData name="Mason Cole" userId="e911393877ad0ee3" providerId="LiveId" clId="{3F842226-8888-4DE6-89C0-62A134D54048}" dt="2021-04-29T04:54:31.201" v="46" actId="1036"/>
+        <pc:chgData name="Mason Cole" userId="e911393877ad0ee3" providerId="LiveId" clId="{3F842226-8888-4DE6-89C0-62A134D54048}" dt="2021-04-29T05:26:29.274" v="50" actId="1076"/>
         <pc:sldMkLst>
           <pc:docMk/>
           <pc:sldMk cId="1905868876" sldId="260"/>
@@ -254,7 +254,7 @@
           </ac:spMkLst>
         </pc:spChg>
         <pc:picChg chg="mod">
-          <ac:chgData name="Mason Cole" userId="e911393877ad0ee3" providerId="LiveId" clId="{3F842226-8888-4DE6-89C0-62A134D54048}" dt="2021-04-29T04:54:31.201" v="46" actId="1036"/>
+          <ac:chgData name="Mason Cole" userId="e911393877ad0ee3" providerId="LiveId" clId="{3F842226-8888-4DE6-89C0-62A134D54048}" dt="2021-04-29T05:26:29.274" v="50" actId="1076"/>
           <ac:picMkLst>
             <pc:docMk/>
             <pc:sldMk cId="1905868876" sldId="260"/>
@@ -262,8 +262,8 @@
           </ac:picMkLst>
         </pc:picChg>
       </pc:sldChg>
-      <pc:sldChg chg="modSp">
-        <pc:chgData name="Mason Cole" userId="e911393877ad0ee3" providerId="LiveId" clId="{3F842226-8888-4DE6-89C0-62A134D54048}" dt="2021-04-29T04:54:22.882" v="17"/>
+      <pc:sldChg chg="modSp mod">
+        <pc:chgData name="Mason Cole" userId="e911393877ad0ee3" providerId="LiveId" clId="{3F842226-8888-4DE6-89C0-62A134D54048}" dt="2021-04-29T11:06:35.181" v="143" actId="20577"/>
         <pc:sldMkLst>
           <pc:docMk/>
           <pc:sldMk cId="1340040923" sldId="261"/>
@@ -277,7 +277,7 @@
           </ac:spMkLst>
         </pc:spChg>
         <pc:spChg chg="mod">
-          <ac:chgData name="Mason Cole" userId="e911393877ad0ee3" providerId="LiveId" clId="{3F842226-8888-4DE6-89C0-62A134D54048}" dt="2021-04-29T04:54:22.882" v="17"/>
+          <ac:chgData name="Mason Cole" userId="e911393877ad0ee3" providerId="LiveId" clId="{3F842226-8888-4DE6-89C0-62A134D54048}" dt="2021-04-29T11:06:35.181" v="143" actId="20577"/>
           <ac:spMkLst>
             <pc:docMk/>
             <pc:sldMk cId="1340040923" sldId="261"/>
@@ -538,7 +538,7 @@
           <a:p>
             <a:fld id="{1CB717E5-9235-41CC-9A32-32BA046779B7}" type="datetimeFigureOut">
               <a:rPr lang="en-US" smtClean="0"/>
-              <a:t>4/28/2021</a:t>
+              <a:t>4/29/2021</a:t>
             </a:fld>
             <a:endParaRPr lang="en-US"/>
           </a:p>
@@ -736,7 +736,7 @@
           <a:p>
             <a:fld id="{1CB717E5-9235-41CC-9A32-32BA046779B7}" type="datetimeFigureOut">
               <a:rPr lang="en-US" smtClean="0"/>
-              <a:t>4/28/2021</a:t>
+              <a:t>4/29/2021</a:t>
             </a:fld>
             <a:endParaRPr lang="en-US"/>
           </a:p>
@@ -944,7 +944,7 @@
           <a:p>
             <a:fld id="{1CB717E5-9235-41CC-9A32-32BA046779B7}" type="datetimeFigureOut">
               <a:rPr lang="en-US" smtClean="0"/>
-              <a:t>4/28/2021</a:t>
+              <a:t>4/29/2021</a:t>
             </a:fld>
             <a:endParaRPr lang="en-US"/>
           </a:p>
@@ -1243,7 +1243,7 @@
           <a:p>
             <a:fld id="{1CB717E5-9235-41CC-9A32-32BA046779B7}" type="datetimeFigureOut">
               <a:rPr lang="en-US" smtClean="0"/>
-              <a:t>4/28/2021</a:t>
+              <a:t>4/29/2021</a:t>
             </a:fld>
             <a:endParaRPr lang="en-US"/>
           </a:p>
@@ -1455,7 +1455,7 @@
           <a:p>
             <a:fld id="{1CB717E5-9235-41CC-9A32-32BA046779B7}" type="datetimeFigureOut">
               <a:rPr lang="en-US" smtClean="0"/>
-              <a:t>4/28/2021</a:t>
+              <a:t>4/29/2021</a:t>
             </a:fld>
             <a:endParaRPr lang="en-US"/>
           </a:p>
@@ -1798,7 +1798,7 @@
           <a:p>
             <a:fld id="{1CB717E5-9235-41CC-9A32-32BA046779B7}" type="datetimeFigureOut">
               <a:rPr lang="en-US" smtClean="0"/>
-              <a:t>4/28/2021</a:t>
+              <a:t>4/29/2021</a:t>
             </a:fld>
             <a:endParaRPr lang="en-US"/>
           </a:p>
@@ -2073,7 +2073,7 @@
           <a:p>
             <a:fld id="{1CB717E5-9235-41CC-9A32-32BA046779B7}" type="datetimeFigureOut">
               <a:rPr lang="en-US" smtClean="0"/>
-              <a:t>4/28/2021</a:t>
+              <a:t>4/29/2021</a:t>
             </a:fld>
             <a:endParaRPr lang="en-US"/>
           </a:p>
@@ -2452,7 +2452,7 @@
           <a:p>
             <a:fld id="{1CB717E5-9235-41CC-9A32-32BA046779B7}" type="datetimeFigureOut">
               <a:rPr lang="en-US" smtClean="0"/>
-              <a:t>4/28/2021</a:t>
+              <a:t>4/29/2021</a:t>
             </a:fld>
             <a:endParaRPr lang="en-US"/>
           </a:p>
@@ -2570,7 +2570,7 @@
           <a:p>
             <a:fld id="{1CB717E5-9235-41CC-9A32-32BA046779B7}" type="datetimeFigureOut">
               <a:rPr lang="en-US" smtClean="0"/>
-              <a:t>4/28/2021</a:t>
+              <a:t>4/29/2021</a:t>
             </a:fld>
             <a:endParaRPr lang="en-US"/>
           </a:p>
@@ -2741,7 +2741,7 @@
           <a:p>
             <a:fld id="{1CB717E5-9235-41CC-9A32-32BA046779B7}" type="datetimeFigureOut">
               <a:rPr lang="en-US" smtClean="0"/>
-              <a:t>4/28/2021</a:t>
+              <a:t>4/29/2021</a:t>
             </a:fld>
             <a:endParaRPr lang="en-US"/>
           </a:p>
@@ -3095,7 +3095,7 @@
           <a:p>
             <a:fld id="{1CB717E5-9235-41CC-9A32-32BA046779B7}" type="datetimeFigureOut">
               <a:rPr lang="en-US" smtClean="0"/>
-              <a:t>4/28/2021</a:t>
+              <a:t>4/29/2021</a:t>
             </a:fld>
             <a:endParaRPr lang="en-US"/>
           </a:p>
@@ -3302,7 +3302,7 @@
           <a:p>
             <a:fld id="{1CB717E5-9235-41CC-9A32-32BA046779B7}" type="datetimeFigureOut">
               <a:rPr lang="en-US" smtClean="0"/>
-              <a:t>4/28/2021</a:t>
+              <a:t>4/29/2021</a:t>
             </a:fld>
             <a:endParaRPr lang="en-US"/>
           </a:p>
@@ -3675,7 +3675,7 @@
           <a:p>
             <a:fld id="{1CB717E5-9235-41CC-9A32-32BA046779B7}" type="datetimeFigureOut">
               <a:rPr lang="en-US" smtClean="0"/>
-              <a:t>4/28/2021</a:t>
+              <a:t>4/29/2021</a:t>
             </a:fld>
             <a:endParaRPr lang="en-US"/>
           </a:p>
@@ -3845,7 +3845,7 @@
           <a:p>
             <a:fld id="{1CB717E5-9235-41CC-9A32-32BA046779B7}" type="datetimeFigureOut">
               <a:rPr lang="en-US" smtClean="0"/>
-              <a:t>4/28/2021</a:t>
+              <a:t>4/29/2021</a:t>
             </a:fld>
             <a:endParaRPr lang="en-US"/>
           </a:p>
@@ -4101,7 +4101,7 @@
           <a:p>
             <a:fld id="{1CB717E5-9235-41CC-9A32-32BA046779B7}" type="datetimeFigureOut">
               <a:rPr lang="en-US" smtClean="0"/>
-              <a:t>4/28/2021</a:t>
+              <a:t>4/29/2021</a:t>
             </a:fld>
             <a:endParaRPr lang="en-US"/>
           </a:p>
@@ -4364,7 +4364,7 @@
           <a:p>
             <a:fld id="{1CB717E5-9235-41CC-9A32-32BA046779B7}" type="datetimeFigureOut">
               <a:rPr lang="en-US" smtClean="0"/>
-              <a:t>4/28/2021</a:t>
+              <a:t>4/29/2021</a:t>
             </a:fld>
             <a:endParaRPr lang="en-US"/>
           </a:p>
@@ -4629,7 +4629,7 @@
           <a:p>
             <a:fld id="{1CB717E5-9235-41CC-9A32-32BA046779B7}" type="datetimeFigureOut">
               <a:rPr lang="en-US" smtClean="0"/>
-              <a:t>4/28/2021</a:t>
+              <a:t>4/29/2021</a:t>
             </a:fld>
             <a:endParaRPr lang="en-US"/>
           </a:p>
@@ -5041,7 +5041,7 @@
           <a:p>
             <a:fld id="{1CB717E5-9235-41CC-9A32-32BA046779B7}" type="datetimeFigureOut">
               <a:rPr lang="en-US" smtClean="0"/>
-              <a:t>4/28/2021</a:t>
+              <a:t>4/29/2021</a:t>
             </a:fld>
             <a:endParaRPr lang="en-US"/>
           </a:p>
@@ -5182,7 +5182,7 @@
           <a:p>
             <a:fld id="{1CB717E5-9235-41CC-9A32-32BA046779B7}" type="datetimeFigureOut">
               <a:rPr lang="en-US" smtClean="0"/>
-              <a:t>4/28/2021</a:t>
+              <a:t>4/29/2021</a:t>
             </a:fld>
             <a:endParaRPr lang="en-US"/>
           </a:p>
@@ -5295,7 +5295,7 @@
           <a:p>
             <a:fld id="{1CB717E5-9235-41CC-9A32-32BA046779B7}" type="datetimeFigureOut">
               <a:rPr lang="en-US" smtClean="0"/>
-              <a:t>4/28/2021</a:t>
+              <a:t>4/29/2021</a:t>
             </a:fld>
             <a:endParaRPr lang="en-US"/>
           </a:p>
@@ -5606,7 +5606,7 @@
           <a:p>
             <a:fld id="{1CB717E5-9235-41CC-9A32-32BA046779B7}" type="datetimeFigureOut">
               <a:rPr lang="en-US" smtClean="0"/>
-              <a:t>4/28/2021</a:t>
+              <a:t>4/29/2021</a:t>
             </a:fld>
             <a:endParaRPr lang="en-US"/>
           </a:p>
@@ -5894,7 +5894,7 @@
           <a:p>
             <a:fld id="{1CB717E5-9235-41CC-9A32-32BA046779B7}" type="datetimeFigureOut">
               <a:rPr lang="en-US" smtClean="0"/>
-              <a:t>4/28/2021</a:t>
+              <a:t>4/29/2021</a:t>
             </a:fld>
             <a:endParaRPr lang="en-US"/>
           </a:p>
@@ -6135,7 +6135,7 @@
           <a:p>
             <a:fld id="{1CB717E5-9235-41CC-9A32-32BA046779B7}" type="datetimeFigureOut">
               <a:rPr lang="en-US" smtClean="0"/>
-              <a:t>4/28/2021</a:t>
+              <a:t>4/29/2021</a:t>
             </a:fld>
             <a:endParaRPr lang="en-US"/>
           </a:p>
@@ -6761,7 +6761,7 @@
           <a:p>
             <a:fld id="{1CB717E5-9235-41CC-9A32-32BA046779B7}" type="datetimeFigureOut">
               <a:rPr lang="en-US" smtClean="0"/>
-              <a:t>4/28/2021</a:t>
+              <a:t>4/29/2021</a:t>
             </a:fld>
             <a:endParaRPr lang="en-US"/>
           </a:p>
@@ -7798,7 +7798,7 @@
           <a:lstStyle/>
           <a:p>
             <a:r>
-              <a:rPr lang="en-US"/>
+              <a:rPr lang="en-US" dirty="0"/>
               <a:t>Coverage Report</a:t>
             </a:r>
           </a:p>
@@ -7828,16 +7828,30 @@
           <a:lstStyle/>
           <a:p>
             <a:r>
-              <a:rPr lang="en-US">
+              <a:rPr lang="en-US" dirty="0">
                 <a:ea typeface="+mn-lt"/>
                 <a:cs typeface="+mn-lt"/>
               </a:rPr>
-              <a:t>Overall 41% on project, ~70% on whitebox-tested classes</a:t>
-            </a:r>
-          </a:p>
-          <a:p>
-            <a:r>
-              <a:rPr lang="en-US">
+              <a:t>Overall 41% on project, ~70% on </a:t>
+            </a:r>
+            <a:r>
+              <a:rPr lang="en-US" dirty="0" err="1">
+                <a:ea typeface="+mn-lt"/>
+                <a:cs typeface="+mn-lt"/>
+              </a:rPr>
+              <a:t>whitebox</a:t>
+            </a:r>
+            <a:r>
+              <a:rPr lang="en-US" dirty="0">
+                <a:ea typeface="+mn-lt"/>
+                <a:cs typeface="+mn-lt"/>
+              </a:rPr>
+              <a:t>-tested classes</a:t>
+            </a:r>
+          </a:p>
+          <a:p>
+            <a:r>
+              <a:rPr lang="en-US" dirty="0">
                 <a:ea typeface="+mn-lt"/>
                 <a:cs typeface="+mn-lt"/>
               </a:rPr>
@@ -7847,7 +7861,7 @@
           <a:p>
             <a:pPr lvl="1"/>
             <a:r>
-              <a:rPr lang="en-US">
+              <a:rPr lang="en-US" dirty="0">
                 <a:ea typeface="+mn-lt"/>
                 <a:cs typeface="+mn-lt"/>
               </a:rPr>
@@ -7857,7 +7871,7 @@
           <a:p>
             <a:pPr lvl="1"/>
             <a:r>
-              <a:rPr lang="en-US">
+              <a:rPr lang="en-US" dirty="0">
                 <a:ea typeface="+mn-lt"/>
                 <a:cs typeface="+mn-lt"/>
               </a:rPr>
@@ -7867,7 +7881,7 @@
           <a:p>
             <a:pPr lvl="1"/>
             <a:r>
-              <a:rPr lang="en-US">
+              <a:rPr lang="en-US" dirty="0">
                 <a:ea typeface="+mn-lt"/>
                 <a:cs typeface="+mn-lt"/>
               </a:rPr>
@@ -7986,31 +8000,31 @@
           <a:lstStyle/>
           <a:p>
             <a:r>
-              <a:rPr lang="en-US"/>
+              <a:rPr lang="en-US" dirty="0"/>
               <a:t>Coupling</a:t>
             </a:r>
           </a:p>
           <a:p>
             <a:r>
-              <a:rPr lang="en-US"/>
+              <a:rPr lang="en-US" dirty="0"/>
               <a:t>Poor architecture</a:t>
             </a:r>
           </a:p>
           <a:p>
             <a:r>
-              <a:rPr lang="en-US"/>
+              <a:rPr lang="en-US" dirty="0"/>
               <a:t>No documentation</a:t>
             </a:r>
           </a:p>
           <a:p>
             <a:r>
-              <a:rPr lang="en-US"/>
+              <a:rPr lang="en-US" dirty="0"/>
               <a:t>Some things left unfinished</a:t>
             </a:r>
           </a:p>
           <a:p>
             <a:r>
-              <a:rPr lang="en-US"/>
+              <a:rPr lang="en-US" dirty="0"/>
               <a:t>Hardcoded inputs</a:t>
             </a:r>
           </a:p>
@@ -8100,7 +8114,45 @@
             <a:pPr marL="0" indent="0">
               <a:buNone/>
             </a:pPr>
-            <a:endParaRPr lang="en-US">
+            <a:r>
+              <a:rPr lang="en-US" dirty="0">
+                <a:cs typeface="Calibri"/>
+              </a:rPr>
+              <a:t>While the SUT doesn't come with direct specifications or an API, the rules it uses are encoded into the mainline Pokémon games which we can use to facilitate black-box testing.</a:t>
+            </a:r>
+          </a:p>
+          <a:p>
+            <a:pPr marL="0" indent="0">
+              <a:buNone/>
+            </a:pPr>
+            <a:endParaRPr lang="en-US" dirty="0">
+              <a:cs typeface="Calibri"/>
+            </a:endParaRPr>
+          </a:p>
+          <a:p>
+            <a:pPr marL="0" indent="0">
+              <a:buNone/>
+            </a:pPr>
+            <a:r>
+              <a:rPr lang="en-US" dirty="0">
+                <a:cs typeface="Calibri"/>
+              </a:rPr>
+              <a:t>Multiplayer gets stuck in an infinite loop during Black-Box Testing</a:t>
+            </a:r>
+          </a:p>
+          <a:p>
+            <a:pPr marL="0" indent="0">
+              <a:buNone/>
+            </a:pPr>
+            <a:endParaRPr lang="en-US" dirty="0">
+              <a:cs typeface="Calibri"/>
+            </a:endParaRPr>
+          </a:p>
+          <a:p>
+            <a:pPr marL="0" indent="0">
+              <a:buNone/>
+            </a:pPr>
+            <a:endParaRPr lang="en-US" dirty="0">
               <a:cs typeface="Calibri"/>
             </a:endParaRPr>
           </a:p>

</xml_diff>

<commit_message>
Quick addition to ppt
</commit_message>
<xml_diff>
--- a/PokemonPresentation.pptx
+++ b/PokemonPresentation.pptx
@@ -173,6 +173,54 @@
     </pc:docChg>
   </pc:docChgLst>
   <pc:docChgLst>
+    <pc:chgData name="Guest User" providerId="Windows Live" clId="Web-{883C95B4-422D-48CC-BD13-244E137905ED}"/>
+    <pc:docChg chg="modSld">
+      <pc:chgData name="Guest User" userId="" providerId="Windows Live" clId="Web-{883C95B4-422D-48CC-BD13-244E137905ED}" dt="2021-04-28T22:43:48.177" v="0" actId="20577"/>
+      <pc:docMkLst>
+        <pc:docMk/>
+      </pc:docMkLst>
+      <pc:sldChg chg="modSp">
+        <pc:chgData name="Guest User" userId="" providerId="Windows Live" clId="Web-{883C95B4-422D-48CC-BD13-244E137905ED}" dt="2021-04-28T22:43:48.177" v="0" actId="20577"/>
+        <pc:sldMkLst>
+          <pc:docMk/>
+          <pc:sldMk cId="2156031259" sldId="262"/>
+        </pc:sldMkLst>
+        <pc:spChg chg="mod">
+          <ac:chgData name="Guest User" userId="" providerId="Windows Live" clId="Web-{883C95B4-422D-48CC-BD13-244E137905ED}" dt="2021-04-28T22:43:48.177" v="0" actId="20577"/>
+          <ac:spMkLst>
+            <pc:docMk/>
+            <pc:sldMk cId="2156031259" sldId="262"/>
+            <ac:spMk id="2" creationId="{8925A9E7-874E-45D9-956A-6C19EFF3E455}"/>
+          </ac:spMkLst>
+        </pc:spChg>
+      </pc:sldChg>
+    </pc:docChg>
+  </pc:docChgLst>
+  <pc:docChgLst>
+    <pc:chgData name="Guest User" providerId="Windows Live" clId="Web-{897A078B-C095-43F3-99C7-246C7BCAAE73}"/>
+    <pc:docChg chg="modSld">
+      <pc:chgData name="Guest User" userId="" providerId="Windows Live" clId="Web-{897A078B-C095-43F3-99C7-246C7BCAAE73}" dt="2021-04-29T16:57:40.232" v="7" actId="20577"/>
+      <pc:docMkLst>
+        <pc:docMk/>
+      </pc:docMkLst>
+      <pc:sldChg chg="modSp">
+        <pc:chgData name="Guest User" userId="" providerId="Windows Live" clId="Web-{897A078B-C095-43F3-99C7-246C7BCAAE73}" dt="2021-04-29T16:57:40.232" v="7" actId="20577"/>
+        <pc:sldMkLst>
+          <pc:docMk/>
+          <pc:sldMk cId="2072145785" sldId="257"/>
+        </pc:sldMkLst>
+        <pc:spChg chg="mod">
+          <ac:chgData name="Guest User" userId="" providerId="Windows Live" clId="Web-{897A078B-C095-43F3-99C7-246C7BCAAE73}" dt="2021-04-29T16:57:40.232" v="7" actId="20577"/>
+          <ac:spMkLst>
+            <pc:docMk/>
+            <pc:sldMk cId="2072145785" sldId="257"/>
+            <ac:spMk id="3" creationId="{E93E7BB8-1806-4F7C-8A75-D8A8C62ED2C8}"/>
+          </ac:spMkLst>
+        </pc:spChg>
+      </pc:sldChg>
+    </pc:docChg>
+  </pc:docChgLst>
+  <pc:docChgLst>
     <pc:chgData name="Mason Cole" userId="e911393877ad0ee3" providerId="LiveId" clId="{3F842226-8888-4DE6-89C0-62A134D54048}"/>
     <pc:docChg chg="undo redo custSel modSld">
       <pc:chgData name="Mason Cole" userId="e911393877ad0ee3" providerId="LiveId" clId="{3F842226-8888-4DE6-89C0-62A134D54048}" dt="2021-04-29T12:03:27.993" v="481" actId="20577"/>
@@ -328,54 +376,6 @@
     </pc:docChg>
   </pc:docChgLst>
   <pc:docChgLst>
-    <pc:chgData name="Guest User" providerId="Windows Live" clId="Web-{897A078B-C095-43F3-99C7-246C7BCAAE73}"/>
-    <pc:docChg chg="modSld">
-      <pc:chgData name="Guest User" userId="" providerId="Windows Live" clId="Web-{897A078B-C095-43F3-99C7-246C7BCAAE73}" dt="2021-04-29T16:57:40.232" v="7" actId="20577"/>
-      <pc:docMkLst>
-        <pc:docMk/>
-      </pc:docMkLst>
-      <pc:sldChg chg="modSp">
-        <pc:chgData name="Guest User" userId="" providerId="Windows Live" clId="Web-{897A078B-C095-43F3-99C7-246C7BCAAE73}" dt="2021-04-29T16:57:40.232" v="7" actId="20577"/>
-        <pc:sldMkLst>
-          <pc:docMk/>
-          <pc:sldMk cId="2072145785" sldId="257"/>
-        </pc:sldMkLst>
-        <pc:spChg chg="mod">
-          <ac:chgData name="Guest User" userId="" providerId="Windows Live" clId="Web-{897A078B-C095-43F3-99C7-246C7BCAAE73}" dt="2021-04-29T16:57:40.232" v="7" actId="20577"/>
-          <ac:spMkLst>
-            <pc:docMk/>
-            <pc:sldMk cId="2072145785" sldId="257"/>
-            <ac:spMk id="3" creationId="{E93E7BB8-1806-4F7C-8A75-D8A8C62ED2C8}"/>
-          </ac:spMkLst>
-        </pc:spChg>
-      </pc:sldChg>
-    </pc:docChg>
-  </pc:docChgLst>
-  <pc:docChgLst>
-    <pc:chgData name="Guest User" providerId="Windows Live" clId="Web-{883C95B4-422D-48CC-BD13-244E137905ED}"/>
-    <pc:docChg chg="modSld">
-      <pc:chgData name="Guest User" userId="" providerId="Windows Live" clId="Web-{883C95B4-422D-48CC-BD13-244E137905ED}" dt="2021-04-28T22:43:48.177" v="0" actId="20577"/>
-      <pc:docMkLst>
-        <pc:docMk/>
-      </pc:docMkLst>
-      <pc:sldChg chg="modSp">
-        <pc:chgData name="Guest User" userId="" providerId="Windows Live" clId="Web-{883C95B4-422D-48CC-BD13-244E137905ED}" dt="2021-04-28T22:43:48.177" v="0" actId="20577"/>
-        <pc:sldMkLst>
-          <pc:docMk/>
-          <pc:sldMk cId="2156031259" sldId="262"/>
-        </pc:sldMkLst>
-        <pc:spChg chg="mod">
-          <ac:chgData name="Guest User" userId="" providerId="Windows Live" clId="Web-{883C95B4-422D-48CC-BD13-244E137905ED}" dt="2021-04-28T22:43:48.177" v="0" actId="20577"/>
-          <ac:spMkLst>
-            <pc:docMk/>
-            <pc:sldMk cId="2156031259" sldId="262"/>
-            <ac:spMk id="2" creationId="{8925A9E7-874E-45D9-956A-6C19EFF3E455}"/>
-          </ac:spMkLst>
-        </pc:spChg>
-      </pc:sldChg>
-    </pc:docChg>
-  </pc:docChgLst>
-  <pc:docChgLst>
     <pc:chgData name="Guest User" providerId="Windows Live" clId="Web-{55C561A1-2C73-48EE-839D-E41FB469E4E1}"/>
     <pc:docChg chg="modSld">
       <pc:chgData name="Guest User" userId="" providerId="Windows Live" clId="Web-{55C561A1-2C73-48EE-839D-E41FB469E4E1}" dt="2021-04-28T19:57:51.053" v="612" actId="1076"/>
@@ -450,6 +450,38 @@
             <ac:spMk id="3" creationId="{EB79CF82-82D1-44C7-B5B0-E22763A0D1FA}"/>
           </ac:spMkLst>
         </pc:spChg>
+      </pc:sldChg>
+    </pc:docChg>
+  </pc:docChgLst>
+  <pc:docChgLst>
+    <pc:chgData name="Mason Cole" userId="e911393877ad0ee3" providerId="LiveId" clId="{63B69953-4247-4192-B234-E998A8B4E76F}"/>
+    <pc:docChg chg="modSld">
+      <pc:chgData name="Mason Cole" userId="e911393877ad0ee3" providerId="LiveId" clId="{63B69953-4247-4192-B234-E998A8B4E76F}" dt="2021-04-29T17:51:18.609" v="70" actId="1076"/>
+      <pc:docMkLst>
+        <pc:docMk/>
+      </pc:docMkLst>
+      <pc:sldChg chg="modSp mod">
+        <pc:chgData name="Mason Cole" userId="e911393877ad0ee3" providerId="LiveId" clId="{63B69953-4247-4192-B234-E998A8B4E76F}" dt="2021-04-29T17:51:18.609" v="70" actId="1076"/>
+        <pc:sldMkLst>
+          <pc:docMk/>
+          <pc:sldMk cId="1905868876" sldId="260"/>
+        </pc:sldMkLst>
+        <pc:spChg chg="mod">
+          <ac:chgData name="Mason Cole" userId="e911393877ad0ee3" providerId="LiveId" clId="{63B69953-4247-4192-B234-E998A8B4E76F}" dt="2021-04-29T17:51:11.310" v="67" actId="20577"/>
+          <ac:spMkLst>
+            <pc:docMk/>
+            <pc:sldMk cId="1905868876" sldId="260"/>
+            <ac:spMk id="3" creationId="{714D6CC5-E55E-4A34-B8EF-E40A451B24E3}"/>
+          </ac:spMkLst>
+        </pc:spChg>
+        <pc:picChg chg="mod">
+          <ac:chgData name="Mason Cole" userId="e911393877ad0ee3" providerId="LiveId" clId="{63B69953-4247-4192-B234-E998A8B4E76F}" dt="2021-04-29T17:51:18.609" v="70" actId="1076"/>
+          <ac:picMkLst>
+            <pc:docMk/>
+            <pc:sldMk cId="1905868876" sldId="260"/>
+            <ac:picMk id="4" creationId="{58E04D11-2CBD-4F84-BCED-7E3CF86B8F1F}"/>
+          </ac:picMkLst>
+        </pc:picChg>
       </pc:sldChg>
     </pc:docChg>
   </pc:docChgLst>
@@ -7620,17 +7652,17 @@
           <a:lstStyle/>
           <a:p>
             <a:r>
-              <a:rPr lang="en-US">
+              <a:rPr lang="en-US" dirty="0">
                 <a:cs typeface="Calibri"/>
               </a:rPr>
               <a:t>A Pok</a:t>
             </a:r>
             <a:r>
-              <a:rPr lang="en-US"/>
+              <a:rPr lang="en-US" dirty="0"/>
               <a:t>émon</a:t>
             </a:r>
             <a:r>
-              <a:rPr lang="en-US">
+              <a:rPr lang="en-US" dirty="0">
                 <a:cs typeface="Calibri"/>
               </a:rPr>
               <a:t> Battle engine coded in Java</a:t>
@@ -7638,7 +7670,7 @@
           </a:p>
           <a:p>
             <a:r>
-              <a:rPr lang="en-US">
+              <a:rPr lang="en-US" dirty="0">
                 <a:cs typeface="Calibri"/>
               </a:rPr>
               <a:t>Has local and multiplayer options (though not perfect)</a:t>
@@ -7646,7 +7678,7 @@
           </a:p>
           <a:p>
             <a:r>
-              <a:rPr lang="en-US">
+              <a:rPr lang="en-US" dirty="0">
                 <a:cs typeface="Calibri"/>
               </a:rPr>
               <a:t>Runs from command line</a:t>
@@ -7654,33 +7686,33 @@
           </a:p>
           <a:p>
             <a:r>
-              <a:rPr lang="en-US">
+              <a:rPr lang="en-US" dirty="0">
                 <a:cs typeface="Calibri"/>
               </a:rPr>
               <a:t>Loads Pok</a:t>
             </a:r>
             <a:r>
-              <a:rPr lang="en-US">
+              <a:rPr lang="en-US" dirty="0">
                 <a:ea typeface="+mn-lt"/>
                 <a:cs typeface="+mn-lt"/>
               </a:rPr>
               <a:t>é</a:t>
             </a:r>
             <a:r>
-              <a:rPr lang="en-US">
+              <a:rPr lang="en-US" dirty="0">
                 <a:cs typeface="Calibri"/>
               </a:rPr>
               <a:t>mon team from .txt files and uses the traditional formatting other Pok</a:t>
             </a:r>
             <a:r>
-              <a:rPr lang="en-US">
+              <a:rPr lang="en-US" dirty="0">
                 <a:ea typeface="+mn-lt"/>
                 <a:cs typeface="+mn-lt"/>
               </a:rPr>
               <a:t>é</a:t>
             </a:r>
             <a:r>
-              <a:rPr lang="en-US">
+              <a:rPr lang="en-US" dirty="0">
                 <a:cs typeface="Calibri"/>
               </a:rPr>
               <a:t>mon simulators use</a:t>
@@ -7689,20 +7721,20 @@
           <a:p>
             <a:pPr marL="383540" lvl="1"/>
             <a:r>
-              <a:rPr lang="en-US">
+              <a:rPr lang="en-US" dirty="0">
                 <a:cs typeface="Calibri"/>
               </a:rPr>
               <a:t>Allows for custom Pok</a:t>
             </a:r>
             <a:r>
-              <a:rPr lang="en-US">
+              <a:rPr lang="en-US" dirty="0">
                 <a:ea typeface="+mn-lt"/>
                 <a:cs typeface="+mn-lt"/>
               </a:rPr>
               <a:t>é</a:t>
             </a:r>
             <a:r>
-              <a:rPr lang="en-US">
+              <a:rPr lang="en-US" dirty="0">
                 <a:cs typeface="Calibri"/>
               </a:rPr>
               <a:t>mon team options</a:t>
@@ -7820,19 +7852,19 @@
           <a:lstStyle/>
           <a:p>
             <a:r>
-              <a:rPr lang="en-US"/>
+              <a:rPr lang="en-US" dirty="0"/>
               <a:t>Whitebox Testing</a:t>
             </a:r>
           </a:p>
           <a:p>
             <a:r>
-              <a:rPr lang="en-US"/>
+              <a:rPr lang="en-US" dirty="0"/>
               <a:t>Blackbox Testing (user based)</a:t>
             </a:r>
           </a:p>
           <a:p>
             <a:r>
-              <a:rPr lang="en-US"/>
+              <a:rPr lang="en-US" dirty="0"/>
               <a:t>Mock Testing</a:t>
             </a:r>
           </a:p>
@@ -7920,21 +7952,21 @@
           <a:lstStyle/>
           <a:p>
             <a:r>
-              <a:rPr lang="en-US">
+              <a:rPr lang="en-US" dirty="0">
                 <a:ea typeface="+mn-lt"/>
                 <a:cs typeface="+mn-lt"/>
               </a:rPr>
               <a:t>Overall 41% on project, ~70% on </a:t>
             </a:r>
             <a:r>
-              <a:rPr lang="en-US" err="1">
+              <a:rPr lang="en-US" dirty="0" err="1">
                 <a:ea typeface="+mn-lt"/>
                 <a:cs typeface="+mn-lt"/>
               </a:rPr>
               <a:t>whitebox</a:t>
             </a:r>
             <a:r>
-              <a:rPr lang="en-US">
+              <a:rPr lang="en-US" dirty="0">
                 <a:ea typeface="+mn-lt"/>
                 <a:cs typeface="+mn-lt"/>
               </a:rPr>
@@ -7943,7 +7975,7 @@
           </a:p>
           <a:p>
             <a:r>
-              <a:rPr lang="en-US">
+              <a:rPr lang="en-US" dirty="0">
                 <a:ea typeface="+mn-lt"/>
                 <a:cs typeface="+mn-lt"/>
               </a:rPr>
@@ -7953,7 +7985,7 @@
           <a:p>
             <a:pPr lvl="1"/>
             <a:r>
-              <a:rPr lang="en-US">
+              <a:rPr lang="en-US" dirty="0">
                 <a:ea typeface="+mn-lt"/>
                 <a:cs typeface="+mn-lt"/>
               </a:rPr>
@@ -7963,7 +7995,7 @@
           <a:p>
             <a:pPr lvl="1"/>
             <a:r>
-              <a:rPr lang="en-US">
+              <a:rPr lang="en-US" dirty="0">
                 <a:ea typeface="+mn-lt"/>
                 <a:cs typeface="+mn-lt"/>
               </a:rPr>
@@ -7973,11 +8005,21 @@
           <a:p>
             <a:pPr lvl="1"/>
             <a:r>
-              <a:rPr lang="en-US">
+              <a:rPr lang="en-US" dirty="0">
                 <a:ea typeface="+mn-lt"/>
                 <a:cs typeface="+mn-lt"/>
               </a:rPr>
               <a:t>Some classes require mock-testing, which is not included in coverage</a:t>
+            </a:r>
+          </a:p>
+          <a:p>
+            <a:pPr lvl="1"/>
+            <a:r>
+              <a:rPr lang="en-US" dirty="0">
+                <a:ea typeface="+mn-lt"/>
+                <a:cs typeface="+mn-lt"/>
+              </a:rPr>
+              <a:t>Some test cases failed resulting in incomplete coverage</a:t>
             </a:r>
           </a:p>
         </p:txBody>
@@ -8004,7 +8046,7 @@
         </p:blipFill>
         <p:spPr>
           <a:xfrm>
-            <a:off x="3487946" y="4063124"/>
+            <a:off x="3739551" y="4236545"/>
             <a:ext cx="4712898" cy="1949431"/>
           </a:xfrm>
           <a:prstGeom prst="rect">

</xml_diff>